<commit_message>
Added materials for WebService Testing
</commit_message>
<xml_diff>
--- a/25. Mobile testing - Appium with Ruby/Appium with Ruby.pptx
+++ b/25. Mobile testing - Appium with Ruby/Appium with Ruby.pptx
@@ -237,7 +237,7 @@
           <a:p>
             <a:fld id="{9C806DFE-78BC-49FF-BE1A-9BBF325A3536}" type="datetimeFigureOut">
               <a:rPr lang="en-US" smtClean="0"/>
-              <a:t>1/19/2016</a:t>
+              <a:t>1/26/2016</a:t>
             </a:fld>
             <a:endParaRPr lang="en-US"/>
           </a:p>
@@ -8595,13 +8595,13 @@
             </a:r>
             <a:r>
               <a:rPr lang="en-US" sz="3000" dirty="0" smtClean="0">
-                <a:hlinkClick r:id="rId2"/>
+                <a:hlinkClick r:id="rId3"/>
               </a:rPr>
               <a:t>https</a:t>
             </a:r>
             <a:r>
               <a:rPr lang="en-US" sz="3000" dirty="0">
-                <a:hlinkClick r:id="rId2"/>
+                <a:hlinkClick r:id="rId3"/>
               </a:rPr>
               <a:t>://github.com/appium/appium/issues/5713 </a:t>
             </a:r>
@@ -10256,6 +10256,7 @@
                     <a:lumMod val="50000"/>
                   </a:schemeClr>
                 </a:solidFill>
+                <a:hlinkClick r:id="rId2"/>
               </a:rPr>
               <a:t> </a:t>
             </a:r>
@@ -10441,13 +10442,6 @@
               </a:rPr>
               <a:t>https://github.com/naskog/telerik-academy</a:t>
             </a:r>
-            <a:endParaRPr lang="en-US" sz="2600" u="sng" dirty="0">
-              <a:solidFill>
-                <a:schemeClr val="tx1">
-                  <a:lumMod val="50000"/>
-                </a:schemeClr>
-              </a:solidFill>
-            </a:endParaRPr>
           </a:p>
           <a:p>
             <a:endParaRPr lang="en-US" sz="1600" dirty="0" smtClean="0">

</xml_diff>